<commit_message>
Fin de clase 4
</commit_message>
<xml_diff>
--- a/Presentaciones/0 - Presentación General.pptx
+++ b/Presentaciones/0 - Presentación General.pptx
@@ -411,7 +411,7 @@
           <a:p>
             <a:fld id="{605C682F-05AF-4625-A0EC-0D4FFCA5E51C}" type="datetimeFigureOut">
               <a:rPr lang="es-CO" smtClean="0"/>
-              <a:t>2/08/2018</a:t>
+              <a:t>6/08/2018</a:t>
             </a:fld>
             <a:endParaRPr lang="es-CO"/>
           </a:p>
@@ -601,7 +601,7 @@
           <a:p>
             <a:fld id="{605C682F-05AF-4625-A0EC-0D4FFCA5E51C}" type="datetimeFigureOut">
               <a:rPr lang="es-CO" smtClean="0"/>
-              <a:t>2/08/2018</a:t>
+              <a:t>6/08/2018</a:t>
             </a:fld>
             <a:endParaRPr lang="es-CO"/>
           </a:p>
@@ -781,7 +781,7 @@
           <a:p>
             <a:fld id="{605C682F-05AF-4625-A0EC-0D4FFCA5E51C}" type="datetimeFigureOut">
               <a:rPr lang="es-CO" smtClean="0"/>
-              <a:t>2/08/2018</a:t>
+              <a:t>6/08/2018</a:t>
             </a:fld>
             <a:endParaRPr lang="es-CO"/>
           </a:p>
@@ -951,7 +951,7 @@
           <a:p>
             <a:fld id="{605C682F-05AF-4625-A0EC-0D4FFCA5E51C}" type="datetimeFigureOut">
               <a:rPr lang="es-CO" smtClean="0"/>
-              <a:t>2/08/2018</a:t>
+              <a:t>6/08/2018</a:t>
             </a:fld>
             <a:endParaRPr lang="es-CO"/>
           </a:p>
@@ -1207,7 +1207,7 @@
           <a:p>
             <a:fld id="{605C682F-05AF-4625-A0EC-0D4FFCA5E51C}" type="datetimeFigureOut">
               <a:rPr lang="es-CO" smtClean="0"/>
-              <a:t>2/08/2018</a:t>
+              <a:t>6/08/2018</a:t>
             </a:fld>
             <a:endParaRPr lang="es-CO"/>
           </a:p>
@@ -1495,7 +1495,7 @@
           <a:p>
             <a:fld id="{605C682F-05AF-4625-A0EC-0D4FFCA5E51C}" type="datetimeFigureOut">
               <a:rPr lang="es-CO" smtClean="0"/>
-              <a:t>2/08/2018</a:t>
+              <a:t>6/08/2018</a:t>
             </a:fld>
             <a:endParaRPr lang="es-CO"/>
           </a:p>
@@ -1933,7 +1933,7 @@
           <a:p>
             <a:fld id="{605C682F-05AF-4625-A0EC-0D4FFCA5E51C}" type="datetimeFigureOut">
               <a:rPr lang="es-CO" smtClean="0"/>
-              <a:t>2/08/2018</a:t>
+              <a:t>6/08/2018</a:t>
             </a:fld>
             <a:endParaRPr lang="es-CO"/>
           </a:p>
@@ -2051,7 +2051,7 @@
           <a:p>
             <a:fld id="{605C682F-05AF-4625-A0EC-0D4FFCA5E51C}" type="datetimeFigureOut">
               <a:rPr lang="es-CO" smtClean="0"/>
-              <a:t>2/08/2018</a:t>
+              <a:t>6/08/2018</a:t>
             </a:fld>
             <a:endParaRPr lang="es-CO"/>
           </a:p>
@@ -2146,7 +2146,7 @@
           <a:p>
             <a:fld id="{605C682F-05AF-4625-A0EC-0D4FFCA5E51C}" type="datetimeFigureOut">
               <a:rPr lang="es-CO" smtClean="0"/>
-              <a:t>2/08/2018</a:t>
+              <a:t>6/08/2018</a:t>
             </a:fld>
             <a:endParaRPr lang="es-CO"/>
           </a:p>
@@ -2502,7 +2502,7 @@
           <a:p>
             <a:fld id="{605C682F-05AF-4625-A0EC-0D4FFCA5E51C}" type="datetimeFigureOut">
               <a:rPr lang="es-CO" smtClean="0"/>
-              <a:t>2/08/2018</a:t>
+              <a:t>6/08/2018</a:t>
             </a:fld>
             <a:endParaRPr lang="es-CO"/>
           </a:p>
@@ -2818,7 +2818,7 @@
           <a:p>
             <a:fld id="{605C682F-05AF-4625-A0EC-0D4FFCA5E51C}" type="datetimeFigureOut">
               <a:rPr lang="es-CO" smtClean="0"/>
-              <a:t>2/08/2018</a:t>
+              <a:t>6/08/2018</a:t>
             </a:fld>
             <a:endParaRPr lang="es-CO"/>
           </a:p>
@@ -3051,7 +3051,7 @@
           <a:p>
             <a:fld id="{605C682F-05AF-4625-A0EC-0D4FFCA5E51C}" type="datetimeFigureOut">
               <a:rPr lang="es-CO" smtClean="0"/>
-              <a:t>2/08/2018</a:t>
+              <a:t>6/08/2018</a:t>
             </a:fld>
             <a:endParaRPr lang="es-CO"/>
           </a:p>
@@ -4552,7 +4552,25 @@
             </a:pPr>
             <a:r>
               <a:rPr lang="es-CO" dirty="0"/>
-              <a:t>Descargar e Instalar Visual Studio Code</a:t>
+              <a:t>Descargar e Instalar Visual Studio Code (PC Lento)</a:t>
+            </a:r>
+          </a:p>
+          <a:p>
+            <a:pPr marL="457200" indent="-457200">
+              <a:buFont typeface="+mj-lt"/>
+              <a:buAutoNum type="arabicPeriod"/>
+            </a:pPr>
+            <a:r>
+              <a:rPr lang="es-CO" dirty="0"/>
+              <a:t>Visual Studio </a:t>
+            </a:r>
+            <a:r>
+              <a:rPr lang="es-CO" dirty="0" err="1"/>
+              <a:t>Community</a:t>
+            </a:r>
+            <a:r>
+              <a:rPr lang="es-CO" dirty="0"/>
+              <a:t> 2017 (PC Bueno)</a:t>
             </a:r>
           </a:p>
         </p:txBody>

</xml_diff>